<commit_message>
added pictures to poster
</commit_message>
<xml_diff>
--- a/documentation/Poster_3.pptx
+++ b/documentation/Poster_3.pptx
@@ -1276,7 +1276,6 @@
               <a:rPr lang="en-GB" sz="8800" b="1" dirty="0" smtClean="0"/>
               <a:t>Arduino Project</a:t>
             </a:r>
-            <a:endParaRPr lang="en-GB" sz="8800" b="1" dirty="0" smtClean="0"/>
           </a:p>
         </p:txBody>
       </p:sp>
@@ -1508,11 +1507,7 @@
           <a:p>
             <a:r>
               <a:rPr lang="en-GB" sz="4000" dirty="0" smtClean="0"/>
-              <a:t>Our project was about implementing the well known game </a:t>
-            </a:r>
-            <a:r>
-              <a:rPr lang="en-GB" sz="4000" dirty="0" smtClean="0"/>
-              <a:t>“</a:t>
+              <a:t>Our project was about implementing the well known game “</a:t>
             </a:r>
             <a:r>
               <a:rPr lang="en-GB" sz="4000" dirty="0" err="1" smtClean="0"/>
@@ -1520,11 +1515,7 @@
             </a:r>
             <a:r>
               <a:rPr lang="en-GB" sz="4000" dirty="0" smtClean="0"/>
-              <a:t>”</a:t>
-            </a:r>
-            <a:r>
-              <a:rPr lang="en-GB" sz="4000" dirty="0" smtClean="0"/>
-              <a:t> on an Arduino </a:t>
+              <a:t>” on an Arduino </a:t>
             </a:r>
             <a:r>
               <a:rPr lang="en-GB" sz="4000" dirty="0"/>
@@ -1576,15 +1567,7 @@
           <a:p>
             <a:r>
               <a:rPr lang="en-GB" sz="4000" dirty="0" smtClean="0"/>
-              <a:t>We used the Arduino Uno board with a 2.8“ TFT resistive touch display. The game was implemented in C++ </a:t>
-            </a:r>
-            <a:r>
-              <a:rPr lang="en-GB" sz="4000" dirty="0" smtClean="0"/>
-              <a:t>with the Arduino Software IDE. To </a:t>
-            </a:r>
-            <a:r>
-              <a:rPr lang="en-GB" sz="4000" dirty="0" smtClean="0"/>
-              <a:t>control the display, like basic drawing and receiving touch input, we applied the provided library from the display manufacturer.</a:t>
+              <a:t>We used the Arduino Uno board with a 2.8“ TFT resistive touch display. The game was implemented in C++ with the Arduino Software IDE. To control the display, like basic drawing and receiving touch input, we applied the provided library from the display manufacturer.</a:t>
             </a:r>
           </a:p>
           <a:p>
@@ -1655,11 +1638,7 @@
             </a:r>
             <a:r>
               <a:rPr lang="en-GB" sz="4000" dirty="0" smtClean="0"/>
-              <a:t>rduino, you can see an intro screen first. After that you get straight to the main menu. </a:t>
-            </a:r>
-            <a:r>
-              <a:rPr lang="en-GB" sz="4000" dirty="0" smtClean="0"/>
-              <a:t>You can choose between four different options:</a:t>
+              <a:t>rduino, you can see an intro screen first. After that you get straight to the main menu. You can choose between four different options:</a:t>
             </a:r>
           </a:p>
           <a:p>
@@ -1809,6 +1788,66 @@
           </a:p>
         </p:txBody>
       </p:sp>
+      <p:pic>
+        <p:nvPicPr>
+          <p:cNvPr id="13" name="Grafik 12"/>
+          <p:cNvPicPr>
+            <a:picLocks noChangeAspect="1"/>
+          </p:cNvPicPr>
+          <p:nvPr/>
+        </p:nvPicPr>
+        <p:blipFill>
+          <a:blip r:embed="rId4" cstate="print">
+            <a:extLst>
+              <a:ext uri="{28A0092B-C50C-407E-A947-70E740481C1C}">
+                <a14:useLocalDpi xmlns:a14="http://schemas.microsoft.com/office/drawing/2010/main" val="0"/>
+              </a:ext>
+            </a:extLst>
+          </a:blip>
+          <a:stretch>
+            <a:fillRect/>
+          </a:stretch>
+        </p:blipFill>
+        <p:spPr>
+          <a:xfrm>
+            <a:off x="9664949" y="29890319"/>
+            <a:ext cx="4069385" cy="5759309"/>
+          </a:xfrm>
+          <a:prstGeom prst="rect">
+            <a:avLst/>
+          </a:prstGeom>
+        </p:spPr>
+      </p:pic>
+      <p:pic>
+        <p:nvPicPr>
+          <p:cNvPr id="14" name="Grafik 13"/>
+          <p:cNvPicPr>
+            <a:picLocks noChangeAspect="1"/>
+          </p:cNvPicPr>
+          <p:nvPr/>
+        </p:nvPicPr>
+        <p:blipFill>
+          <a:blip r:embed="rId5" cstate="print">
+            <a:extLst>
+              <a:ext uri="{28A0092B-C50C-407E-A947-70E740481C1C}">
+                <a14:useLocalDpi xmlns:a14="http://schemas.microsoft.com/office/drawing/2010/main" val="0"/>
+              </a:ext>
+            </a:extLst>
+          </a:blip>
+          <a:stretch>
+            <a:fillRect/>
+          </a:stretch>
+        </p:blipFill>
+        <p:spPr>
+          <a:xfrm>
+            <a:off x="14774316" y="29890320"/>
+            <a:ext cx="4101837" cy="5786249"/>
+          </a:xfrm>
+          <a:prstGeom prst="rect">
+            <a:avLst/>
+          </a:prstGeom>
+        </p:spPr>
+      </p:pic>
     </p:spTree>
   </p:cSld>
   <p:clrMapOvr>

</xml_diff>